<commit_message>
Izlabota prezentācija un pievienotas animācijas
</commit_message>
<xml_diff>
--- a/Simbolu virknes.pptx
+++ b/Simbolu virknes.pptx
@@ -6685,7 +6685,7 @@
         </p:blipFill>
         <p:spPr>
           <a:xfrm>
-            <a:off x="1854842" y="5123871"/>
+            <a:off x="1854842" y="5129815"/>
             <a:ext cx="2743200" cy="468489"/>
           </a:xfrm>
           <a:prstGeom prst="rect">
@@ -6736,7 +6736,7 @@
               </a:rPr>
               <a:t> visu elementu pārrakstīšana kā mazie vai lielie burti</a:t>
             </a:r>
-            <a:endParaRPr lang="lv-LV" sz="2400" b="1">
+            <a:endParaRPr lang="lv-LV" sz="2400" b="1" dirty="0">
               <a:latin typeface="Cambria"/>
               <a:ea typeface="Cambria"/>
             </a:endParaRPr>
@@ -6812,6 +6812,165 @@
   <p:clrMapOvr>
     <a:masterClrMapping/>
   </p:clrMapOvr>
+  <p:transition spd="slow">
+    <p:push dir="u"/>
+  </p:transition>
+  <p:timing>
+    <p:tnLst>
+      <p:par>
+        <p:cTn id="1" dur="indefinite" restart="never" nodeType="tmRoot">
+          <p:childTnLst>
+            <p:seq concurrent="1" nextAc="seek">
+              <p:cTn id="2" dur="indefinite" nodeType="mainSeq">
+                <p:childTnLst>
+                  <p:par>
+                    <p:cTn id="3" fill="hold">
+                      <p:stCondLst>
+                        <p:cond delay="indefinite"/>
+                      </p:stCondLst>
+                      <p:childTnLst>
+                        <p:par>
+                          <p:cTn id="4" fill="hold">
+                            <p:stCondLst>
+                              <p:cond delay="0"/>
+                            </p:stCondLst>
+                            <p:childTnLst>
+                              <p:par>
+                                <p:cTn id="5" presetID="10" presetClass="entr" presetSubtype="0" fill="hold" grpId="0" nodeType="clickEffect">
+                                  <p:stCondLst>
+                                    <p:cond delay="0"/>
+                                  </p:stCondLst>
+                                  <p:childTnLst>
+                                    <p:set>
+                                      <p:cBhvr>
+                                        <p:cTn id="6" dur="1" fill="hold">
+                                          <p:stCondLst>
+                                            <p:cond delay="0"/>
+                                          </p:stCondLst>
+                                        </p:cTn>
+                                        <p:tgtEl>
+                                          <p:spTgt spid="9"/>
+                                        </p:tgtEl>
+                                        <p:attrNameLst>
+                                          <p:attrName>style.visibility</p:attrName>
+                                        </p:attrNameLst>
+                                      </p:cBhvr>
+                                      <p:to>
+                                        <p:strVal val="visible"/>
+                                      </p:to>
+                                    </p:set>
+                                    <p:animEffect transition="in" filter="fade">
+                                      <p:cBhvr>
+                                        <p:cTn id="7" dur="500"/>
+                                        <p:tgtEl>
+                                          <p:spTgt spid="9"/>
+                                        </p:tgtEl>
+                                      </p:cBhvr>
+                                    </p:animEffect>
+                                  </p:childTnLst>
+                                </p:cTn>
+                              </p:par>
+                              <p:par>
+                                <p:cTn id="8" presetID="10" presetClass="entr" presetSubtype="0" fill="hold" nodeType="withEffect">
+                                  <p:stCondLst>
+                                    <p:cond delay="0"/>
+                                  </p:stCondLst>
+                                  <p:childTnLst>
+                                    <p:set>
+                                      <p:cBhvr>
+                                        <p:cTn id="9" dur="1" fill="hold">
+                                          <p:stCondLst>
+                                            <p:cond delay="0"/>
+                                          </p:stCondLst>
+                                        </p:cTn>
+                                        <p:tgtEl>
+                                          <p:spTgt spid="2"/>
+                                        </p:tgtEl>
+                                        <p:attrNameLst>
+                                          <p:attrName>style.visibility</p:attrName>
+                                        </p:attrNameLst>
+                                      </p:cBhvr>
+                                      <p:to>
+                                        <p:strVal val="visible"/>
+                                      </p:to>
+                                    </p:set>
+                                    <p:animEffect transition="in" filter="fade">
+                                      <p:cBhvr>
+                                        <p:cTn id="10" dur="500"/>
+                                        <p:tgtEl>
+                                          <p:spTgt spid="2"/>
+                                        </p:tgtEl>
+                                      </p:cBhvr>
+                                    </p:animEffect>
+                                  </p:childTnLst>
+                                </p:cTn>
+                              </p:par>
+                              <p:par>
+                                <p:cTn id="11" presetID="10" presetClass="entr" presetSubtype="0" fill="hold" nodeType="withEffect">
+                                  <p:stCondLst>
+                                    <p:cond delay="0"/>
+                                  </p:stCondLst>
+                                  <p:childTnLst>
+                                    <p:set>
+                                      <p:cBhvr>
+                                        <p:cTn id="12" dur="1" fill="hold">
+                                          <p:stCondLst>
+                                            <p:cond delay="0"/>
+                                          </p:stCondLst>
+                                        </p:cTn>
+                                        <p:tgtEl>
+                                          <p:spTgt spid="3"/>
+                                        </p:tgtEl>
+                                        <p:attrNameLst>
+                                          <p:attrName>style.visibility</p:attrName>
+                                        </p:attrNameLst>
+                                      </p:cBhvr>
+                                      <p:to>
+                                        <p:strVal val="visible"/>
+                                      </p:to>
+                                    </p:set>
+                                    <p:animEffect transition="in" filter="fade">
+                                      <p:cBhvr>
+                                        <p:cTn id="13" dur="500"/>
+                                        <p:tgtEl>
+                                          <p:spTgt spid="3"/>
+                                        </p:tgtEl>
+                                      </p:cBhvr>
+                                    </p:animEffect>
+                                  </p:childTnLst>
+                                </p:cTn>
+                              </p:par>
+                            </p:childTnLst>
+                          </p:cTn>
+                        </p:par>
+                      </p:childTnLst>
+                    </p:cTn>
+                  </p:par>
+                </p:childTnLst>
+              </p:cTn>
+              <p:prevCondLst>
+                <p:cond evt="onPrev" delay="0">
+                  <p:tgtEl>
+                    <p:sldTgt/>
+                  </p:tgtEl>
+                </p:cond>
+              </p:prevCondLst>
+              <p:nextCondLst>
+                <p:cond evt="onNext" delay="0">
+                  <p:tgtEl>
+                    <p:sldTgt/>
+                  </p:tgtEl>
+                </p:cond>
+              </p:nextCondLst>
+            </p:seq>
+          </p:childTnLst>
+        </p:cTn>
+      </p:par>
+    </p:tnLst>
+    <p:bldLst>
+      <p:bldP spid="9" grpId="0"/>
+    </p:bldLst>
+  </p:timing>
 </p:sld>
 </file>
 
@@ -6948,6 +7107,9 @@
   <p:clrMapOvr>
     <a:masterClrMapping/>
   </p:clrMapOvr>
+  <p:transition spd="slow">
+    <p:push dir="u"/>
+  </p:transition>
 </p:sld>
 </file>
 
@@ -6970,31 +7132,6 @@
       </p:grpSpPr>
       <p:sp>
         <p:nvSpPr>
-          <p:cNvPr id="2" name="Заголовок 1">
-            <a:extLst>
-              <a:ext uri="{FF2B5EF4-FFF2-40B4-BE49-F238E27FC236}">
-                <a16:creationId xmlns:a16="http://schemas.microsoft.com/office/drawing/2014/main" id="{30CF96B5-5030-8D70-FEC1-1D0484648678}"/>
-              </a:ext>
-            </a:extLst>
-          </p:cNvPr>
-          <p:cNvSpPr>
-            <a:spLocks noGrp="1"/>
-          </p:cNvSpPr>
-          <p:nvPr>
-            <p:ph type="title"/>
-          </p:nvPr>
-        </p:nvSpPr>
-        <p:spPr/>
-        <p:txBody>
-          <a:bodyPr/>
-          <a:lstStyle/>
-          <a:p>
-            <a:endParaRPr lang="ru-RU"/>
-          </a:p>
-        </p:txBody>
-      </p:sp>
-      <p:sp>
-        <p:nvSpPr>
           <p:cNvPr id="3" name="Объект 2">
             <a:extLst>
               <a:ext uri="{FF2B5EF4-FFF2-40B4-BE49-F238E27FC236}">
@@ -7135,6 +7272,42 @@
           </a:p>
         </p:txBody>
       </p:sp>
+      <p:sp>
+        <p:nvSpPr>
+          <p:cNvPr id="4" name="TextBox 3">
+            <a:extLst>
+              <a:ext uri="{FF2B5EF4-FFF2-40B4-BE49-F238E27FC236}">
+                <a16:creationId xmlns:a16="http://schemas.microsoft.com/office/drawing/2014/main" id="{9A52D7BF-E256-9702-6C49-923C6775FA3B}"/>
+              </a:ext>
+            </a:extLst>
+          </p:cNvPr>
+          <p:cNvSpPr txBox="1"/>
+          <p:nvPr/>
+        </p:nvSpPr>
+        <p:spPr>
+          <a:xfrm>
+            <a:off x="1227482" y="1257300"/>
+            <a:ext cx="6072809" cy="400110"/>
+          </a:xfrm>
+          <a:prstGeom prst="rect">
+            <a:avLst/>
+          </a:prstGeom>
+          <a:noFill/>
+        </p:spPr>
+        <p:txBody>
+          <a:bodyPr wrap="square" rtlCol="0">
+            <a:spAutoFit/>
+          </a:bodyPr>
+          <a:lstStyle/>
+          <a:p>
+            <a:r>
+              <a:rPr lang="lv-LV" sz="2000" b="1" dirty="0"/>
+              <a:t>Izmantojamie informācijas avoti:</a:t>
+            </a:r>
+            <a:endParaRPr lang="ru-RU" sz="2000" b="1" dirty="0"/>
+          </a:p>
+        </p:txBody>
+      </p:sp>
     </p:spTree>
     <p:extLst>
       <p:ext uri="{BB962C8B-B14F-4D97-AF65-F5344CB8AC3E}">
@@ -7145,6 +7318,9 @@
   <p:clrMapOvr>
     <a:masterClrMapping/>
   </p:clrMapOvr>
+  <p:transition spd="slow">
+    <p:push dir="u"/>
+  </p:transition>
 </p:sld>
 </file>
 
@@ -7423,6 +7599,9 @@
   <p:clrMapOvr>
     <a:masterClrMapping/>
   </p:clrMapOvr>
+  <p:transition spd="slow">
+    <p:push dir="u"/>
+  </p:transition>
 </p:sld>
 </file>
 
@@ -7981,7 +8160,7 @@
               <a:t> </a:t>
             </a:r>
             <a:r>
-              <a:rPr lang="en-US" sz="2600" err="1">
+              <a:rPr lang="en-US" sz="2600" dirty="0" err="1">
                 <a:latin typeface="Cambria"/>
                 <a:ea typeface="Cambria"/>
               </a:rPr>
@@ -7998,7 +8177,7 @@
           <a:p>
             <a:pPr algn="ctr"/>
             <a:r>
-              <a:rPr lang="en-US" sz="2600" err="1">
+              <a:rPr lang="en-US" sz="2600" dirty="0" err="1">
                 <a:latin typeface="Cambria"/>
                 <a:ea typeface="Cambria"/>
               </a:rPr>
@@ -8012,13 +8191,13 @@
               <a:t> </a:t>
             </a:r>
             <a:r>
-              <a:rPr lang="en-US" sz="2600" err="1">
+              <a:rPr lang="en-US" sz="2600" dirty="0" err="1">
                 <a:latin typeface="Cambria"/>
                 <a:ea typeface="Cambria"/>
               </a:rPr>
               <a:t>masīvus</a:t>
             </a:r>
-            <a:endParaRPr lang="en-US" sz="2600">
+            <a:endParaRPr lang="en-US" sz="2600" dirty="0">
               <a:latin typeface="Cambria"/>
               <a:ea typeface="Cambria"/>
             </a:endParaRPr>
@@ -8058,7 +8237,7 @@
           <a:p>
             <a:pPr algn="ctr"/>
             <a:r>
-              <a:rPr lang="en-US" sz="2600" err="1">
+              <a:rPr lang="en-US" sz="2600" dirty="0" err="1">
                 <a:latin typeface="Cambria"/>
                 <a:ea typeface="Cambria"/>
               </a:rPr>
@@ -8072,7 +8251,7 @@
               <a:t> </a:t>
             </a:r>
             <a:r>
-              <a:rPr lang="en-US" sz="2600" err="1">
+              <a:rPr lang="en-US" sz="2600" dirty="0" err="1">
                 <a:latin typeface="Cambria"/>
                 <a:ea typeface="Cambria"/>
               </a:rPr>
@@ -8086,7 +8265,7 @@
               <a:t> </a:t>
             </a:r>
             <a:r>
-              <a:rPr lang="en-US" sz="2600" err="1">
+              <a:rPr lang="en-US" sz="2600" dirty="0" err="1">
                 <a:latin typeface="Cambria"/>
                 <a:ea typeface="Cambria"/>
               </a:rPr>
@@ -8436,6 +8615,291 @@
   <p:clrMapOvr>
     <a:masterClrMapping/>
   </p:clrMapOvr>
+  <p:transition spd="slow">
+    <p:push dir="u"/>
+  </p:transition>
+  <p:timing>
+    <p:tnLst>
+      <p:par>
+        <p:cTn id="1" dur="indefinite" restart="never" nodeType="tmRoot">
+          <p:childTnLst>
+            <p:seq concurrent="1" nextAc="seek">
+              <p:cTn id="2" dur="indefinite" nodeType="mainSeq">
+                <p:childTnLst>
+                  <p:par>
+                    <p:cTn id="3" fill="hold">
+                      <p:stCondLst>
+                        <p:cond delay="indefinite"/>
+                      </p:stCondLst>
+                      <p:childTnLst>
+                        <p:par>
+                          <p:cTn id="4" fill="hold">
+                            <p:stCondLst>
+                              <p:cond delay="0"/>
+                            </p:stCondLst>
+                            <p:childTnLst>
+                              <p:par>
+                                <p:cTn id="5" presetID="10" presetClass="entr" presetSubtype="0" fill="hold" grpId="0" nodeType="clickEffect">
+                                  <p:stCondLst>
+                                    <p:cond delay="0"/>
+                                  </p:stCondLst>
+                                  <p:childTnLst>
+                                    <p:set>
+                                      <p:cBhvr>
+                                        <p:cTn id="6" dur="1" fill="hold">
+                                          <p:stCondLst>
+                                            <p:cond delay="0"/>
+                                          </p:stCondLst>
+                                        </p:cTn>
+                                        <p:tgtEl>
+                                          <p:spTgt spid="2"/>
+                                        </p:tgtEl>
+                                        <p:attrNameLst>
+                                          <p:attrName>style.visibility</p:attrName>
+                                        </p:attrNameLst>
+                                      </p:cBhvr>
+                                      <p:to>
+                                        <p:strVal val="visible"/>
+                                      </p:to>
+                                    </p:set>
+                                    <p:animEffect transition="in" filter="fade">
+                                      <p:cBhvr>
+                                        <p:cTn id="7" dur="500"/>
+                                        <p:tgtEl>
+                                          <p:spTgt spid="2"/>
+                                        </p:tgtEl>
+                                      </p:cBhvr>
+                                    </p:animEffect>
+                                  </p:childTnLst>
+                                </p:cTn>
+                              </p:par>
+                              <p:par>
+                                <p:cTn id="8" presetID="10" presetClass="entr" presetSubtype="0" fill="hold" nodeType="withEffect">
+                                  <p:stCondLst>
+                                    <p:cond delay="0"/>
+                                  </p:stCondLst>
+                                  <p:childTnLst>
+                                    <p:set>
+                                      <p:cBhvr>
+                                        <p:cTn id="9" dur="1" fill="hold">
+                                          <p:stCondLst>
+                                            <p:cond delay="0"/>
+                                          </p:stCondLst>
+                                        </p:cTn>
+                                        <p:tgtEl>
+                                          <p:spTgt spid="8"/>
+                                        </p:tgtEl>
+                                        <p:attrNameLst>
+                                          <p:attrName>style.visibility</p:attrName>
+                                        </p:attrNameLst>
+                                      </p:cBhvr>
+                                      <p:to>
+                                        <p:strVal val="visible"/>
+                                      </p:to>
+                                    </p:set>
+                                    <p:animEffect transition="in" filter="fade">
+                                      <p:cBhvr>
+                                        <p:cTn id="10" dur="500"/>
+                                        <p:tgtEl>
+                                          <p:spTgt spid="8"/>
+                                        </p:tgtEl>
+                                      </p:cBhvr>
+                                    </p:animEffect>
+                                  </p:childTnLst>
+                                </p:cTn>
+                              </p:par>
+                              <p:par>
+                                <p:cTn id="11" presetID="10" presetClass="entr" presetSubtype="0" fill="hold" grpId="0" nodeType="withEffect">
+                                  <p:stCondLst>
+                                    <p:cond delay="0"/>
+                                  </p:stCondLst>
+                                  <p:childTnLst>
+                                    <p:set>
+                                      <p:cBhvr>
+                                        <p:cTn id="12" dur="1" fill="hold">
+                                          <p:stCondLst>
+                                            <p:cond delay="0"/>
+                                          </p:stCondLst>
+                                        </p:cTn>
+                                        <p:tgtEl>
+                                          <p:spTgt spid="5"/>
+                                        </p:tgtEl>
+                                        <p:attrNameLst>
+                                          <p:attrName>style.visibility</p:attrName>
+                                        </p:attrNameLst>
+                                      </p:cBhvr>
+                                      <p:to>
+                                        <p:strVal val="visible"/>
+                                      </p:to>
+                                    </p:set>
+                                    <p:animEffect transition="in" filter="fade">
+                                      <p:cBhvr>
+                                        <p:cTn id="13" dur="500"/>
+                                        <p:tgtEl>
+                                          <p:spTgt spid="5"/>
+                                        </p:tgtEl>
+                                      </p:cBhvr>
+                                    </p:animEffect>
+                                  </p:childTnLst>
+                                </p:cTn>
+                              </p:par>
+                            </p:childTnLst>
+                          </p:cTn>
+                        </p:par>
+                      </p:childTnLst>
+                    </p:cTn>
+                  </p:par>
+                  <p:par>
+                    <p:cTn id="14" fill="hold">
+                      <p:stCondLst>
+                        <p:cond delay="indefinite"/>
+                      </p:stCondLst>
+                      <p:childTnLst>
+                        <p:par>
+                          <p:cTn id="15" fill="hold">
+                            <p:stCondLst>
+                              <p:cond delay="0"/>
+                            </p:stCondLst>
+                            <p:childTnLst>
+                              <p:par>
+                                <p:cTn id="16" presetID="10" presetClass="entr" presetSubtype="0" fill="hold" grpId="0" nodeType="clickEffect">
+                                  <p:stCondLst>
+                                    <p:cond delay="0"/>
+                                  </p:stCondLst>
+                                  <p:childTnLst>
+                                    <p:set>
+                                      <p:cBhvr>
+                                        <p:cTn id="17" dur="1" fill="hold">
+                                          <p:stCondLst>
+                                            <p:cond delay="0"/>
+                                          </p:stCondLst>
+                                        </p:cTn>
+                                        <p:tgtEl>
+                                          <p:spTgt spid="9"/>
+                                        </p:tgtEl>
+                                        <p:attrNameLst>
+                                          <p:attrName>style.visibility</p:attrName>
+                                        </p:attrNameLst>
+                                      </p:cBhvr>
+                                      <p:to>
+                                        <p:strVal val="visible"/>
+                                      </p:to>
+                                    </p:set>
+                                    <p:animEffect transition="in" filter="fade">
+                                      <p:cBhvr>
+                                        <p:cTn id="18" dur="500"/>
+                                        <p:tgtEl>
+                                          <p:spTgt spid="9"/>
+                                        </p:tgtEl>
+                                      </p:cBhvr>
+                                    </p:animEffect>
+                                  </p:childTnLst>
+                                </p:cTn>
+                              </p:par>
+                              <p:par>
+                                <p:cTn id="19" presetID="10" presetClass="entr" presetSubtype="0" fill="hold" nodeType="withEffect">
+                                  <p:stCondLst>
+                                    <p:cond delay="0"/>
+                                  </p:stCondLst>
+                                  <p:childTnLst>
+                                    <p:set>
+                                      <p:cBhvr>
+                                        <p:cTn id="20" dur="1" fill="hold">
+                                          <p:stCondLst>
+                                            <p:cond delay="0"/>
+                                          </p:stCondLst>
+                                        </p:cTn>
+                                        <p:tgtEl>
+                                          <p:spTgt spid="10"/>
+                                        </p:tgtEl>
+                                        <p:attrNameLst>
+                                          <p:attrName>style.visibility</p:attrName>
+                                        </p:attrNameLst>
+                                      </p:cBhvr>
+                                      <p:to>
+                                        <p:strVal val="visible"/>
+                                      </p:to>
+                                    </p:set>
+                                    <p:animEffect transition="in" filter="fade">
+                                      <p:cBhvr>
+                                        <p:cTn id="21" dur="500"/>
+                                        <p:tgtEl>
+                                          <p:spTgt spid="10"/>
+                                        </p:tgtEl>
+                                      </p:cBhvr>
+                                    </p:animEffect>
+                                  </p:childTnLst>
+                                </p:cTn>
+                              </p:par>
+                              <p:par>
+                                <p:cTn id="22" presetID="10" presetClass="entr" presetSubtype="0" fill="hold" grpId="0" nodeType="withEffect">
+                                  <p:stCondLst>
+                                    <p:cond delay="0"/>
+                                  </p:stCondLst>
+                                  <p:childTnLst>
+                                    <p:set>
+                                      <p:cBhvr>
+                                        <p:cTn id="23" dur="1" fill="hold">
+                                          <p:stCondLst>
+                                            <p:cond delay="0"/>
+                                          </p:stCondLst>
+                                        </p:cTn>
+                                        <p:tgtEl>
+                                          <p:spTgt spid="4"/>
+                                        </p:tgtEl>
+                                        <p:attrNameLst>
+                                          <p:attrName>style.visibility</p:attrName>
+                                        </p:attrNameLst>
+                                      </p:cBhvr>
+                                      <p:to>
+                                        <p:strVal val="visible"/>
+                                      </p:to>
+                                    </p:set>
+                                    <p:animEffect transition="in" filter="fade">
+                                      <p:cBhvr>
+                                        <p:cTn id="24" dur="500"/>
+                                        <p:tgtEl>
+                                          <p:spTgt spid="4"/>
+                                        </p:tgtEl>
+                                      </p:cBhvr>
+                                    </p:animEffect>
+                                  </p:childTnLst>
+                                </p:cTn>
+                              </p:par>
+                            </p:childTnLst>
+                          </p:cTn>
+                        </p:par>
+                      </p:childTnLst>
+                    </p:cTn>
+                  </p:par>
+                </p:childTnLst>
+              </p:cTn>
+              <p:prevCondLst>
+                <p:cond evt="onPrev" delay="0">
+                  <p:tgtEl>
+                    <p:sldTgt/>
+                  </p:tgtEl>
+                </p:cond>
+              </p:prevCondLst>
+              <p:nextCondLst>
+                <p:cond evt="onNext" delay="0">
+                  <p:tgtEl>
+                    <p:sldTgt/>
+                  </p:tgtEl>
+                </p:cond>
+              </p:nextCondLst>
+            </p:seq>
+          </p:childTnLst>
+        </p:cTn>
+      </p:par>
+    </p:tnLst>
+    <p:bldLst>
+      <p:bldP spid="9" grpId="0"/>
+      <p:bldP spid="2" grpId="0"/>
+      <p:bldP spid="4" grpId="0"/>
+      <p:bldP spid="5" grpId="0"/>
+    </p:bldLst>
+  </p:timing>
 </p:sld>
 </file>
 
@@ -8783,6 +9247,9 @@
   <p:clrMapOvr>
     <a:masterClrMapping/>
   </p:clrMapOvr>
+  <p:transition spd="slow">
+    <p:push dir="u"/>
+  </p:transition>
 </p:sld>
 </file>
 
@@ -9165,7 +9632,7 @@
               <a:buChar char="Ø"/>
             </a:pPr>
             <a:r>
-              <a:rPr lang="en-US" sz="2400" err="1">
+              <a:rPr lang="en-US" sz="2400" dirty="0" err="1">
                 <a:latin typeface="Cambria"/>
                 <a:ea typeface="Cambria"/>
               </a:rPr>
@@ -9179,7 +9646,7 @@
               <a:t> </a:t>
             </a:r>
             <a:r>
-              <a:rPr lang="en-US" sz="2400" err="1">
+              <a:rPr lang="en-US" sz="2400" dirty="0" err="1">
                 <a:latin typeface="Cambria"/>
                 <a:ea typeface="Cambria"/>
               </a:rPr>
@@ -9193,7 +9660,7 @@
               <a:t> </a:t>
             </a:r>
             <a:r>
-              <a:rPr lang="en-US" sz="2400" err="1">
+              <a:rPr lang="en-US" sz="2400" dirty="0" err="1">
                 <a:latin typeface="Cambria"/>
                 <a:ea typeface="Cambria"/>
               </a:rPr>
@@ -9207,7 +9674,7 @@
               <a:t> </a:t>
             </a:r>
             <a:r>
-              <a:rPr lang="en-US" sz="2400" err="1">
+              <a:rPr lang="en-US" sz="2400" dirty="0" err="1">
                 <a:latin typeface="Cambria"/>
                 <a:ea typeface="Cambria"/>
               </a:rPr>
@@ -9231,7 +9698,7 @@
               <a:t>    </a:t>
             </a:r>
             <a:r>
-              <a:rPr lang="en-US" sz="2400" err="1">
+              <a:rPr lang="en-US" sz="2400" dirty="0" err="1">
                 <a:latin typeface="Cambria"/>
                 <a:ea typeface="+mn-lt"/>
                 <a:cs typeface="+mn-lt"/>
@@ -9247,7 +9714,7 @@
               <a:t> </a:t>
             </a:r>
             <a:r>
-              <a:rPr lang="en-US" sz="2400" err="1">
+              <a:rPr lang="en-US" sz="2400" dirty="0" err="1">
                 <a:latin typeface="Cambria"/>
                 <a:ea typeface="+mn-lt"/>
                 <a:cs typeface="+mn-lt"/>
@@ -9285,7 +9752,7 @@
               <a:t> </a:t>
             </a:r>
             <a:r>
-              <a:rPr lang="en-US" sz="2400" err="1">
+              <a:rPr lang="en-US" sz="2400" dirty="0" err="1">
                 <a:latin typeface="Cambria"/>
                 <a:ea typeface="+mn-lt"/>
                 <a:cs typeface="+mn-lt"/>
@@ -9314,7 +9781,7 @@
               </a:rPr>
               <a:t>length()</a:t>
             </a:r>
-            <a:endParaRPr lang="en-US" sz="2400">
+            <a:endParaRPr lang="en-US" sz="2400" dirty="0">
               <a:solidFill>
                 <a:schemeClr val="accent1">
                   <a:lumMod val="40000"/>
@@ -9425,6 +9892,289 @@
   <p:clrMapOvr>
     <a:masterClrMapping/>
   </p:clrMapOvr>
+  <p:transition spd="slow">
+    <p:push dir="u"/>
+  </p:transition>
+  <p:timing>
+    <p:tnLst>
+      <p:par>
+        <p:cTn id="1" dur="indefinite" restart="never" nodeType="tmRoot">
+          <p:childTnLst>
+            <p:seq concurrent="1" nextAc="seek">
+              <p:cTn id="2" dur="indefinite" nodeType="mainSeq">
+                <p:childTnLst>
+                  <p:par>
+                    <p:cTn id="3" fill="hold">
+                      <p:stCondLst>
+                        <p:cond delay="indefinite"/>
+                      </p:stCondLst>
+                      <p:childTnLst>
+                        <p:par>
+                          <p:cTn id="4" fill="hold">
+                            <p:stCondLst>
+                              <p:cond delay="0"/>
+                            </p:stCondLst>
+                            <p:childTnLst>
+                              <p:par>
+                                <p:cTn id="5" presetID="10" presetClass="entr" presetSubtype="0" fill="hold" grpId="0" nodeType="clickEffect">
+                                  <p:stCondLst>
+                                    <p:cond delay="0"/>
+                                  </p:stCondLst>
+                                  <p:childTnLst>
+                                    <p:set>
+                                      <p:cBhvr>
+                                        <p:cTn id="6" dur="1" fill="hold">
+                                          <p:stCondLst>
+                                            <p:cond delay="0"/>
+                                          </p:stCondLst>
+                                        </p:cTn>
+                                        <p:tgtEl>
+                                          <p:spTgt spid="5"/>
+                                        </p:tgtEl>
+                                        <p:attrNameLst>
+                                          <p:attrName>style.visibility</p:attrName>
+                                        </p:attrNameLst>
+                                      </p:cBhvr>
+                                      <p:to>
+                                        <p:strVal val="visible"/>
+                                      </p:to>
+                                    </p:set>
+                                    <p:animEffect transition="in" filter="fade">
+                                      <p:cBhvr>
+                                        <p:cTn id="7" dur="500"/>
+                                        <p:tgtEl>
+                                          <p:spTgt spid="5"/>
+                                        </p:tgtEl>
+                                      </p:cBhvr>
+                                    </p:animEffect>
+                                  </p:childTnLst>
+                                </p:cTn>
+                              </p:par>
+                              <p:par>
+                                <p:cTn id="8" presetID="10" presetClass="entr" presetSubtype="0" fill="hold" nodeType="withEffect">
+                                  <p:stCondLst>
+                                    <p:cond delay="0"/>
+                                  </p:stCondLst>
+                                  <p:childTnLst>
+                                    <p:set>
+                                      <p:cBhvr>
+                                        <p:cTn id="9" dur="1" fill="hold">
+                                          <p:stCondLst>
+                                            <p:cond delay="0"/>
+                                          </p:stCondLst>
+                                        </p:cTn>
+                                        <p:tgtEl>
+                                          <p:spTgt spid="3"/>
+                                        </p:tgtEl>
+                                        <p:attrNameLst>
+                                          <p:attrName>style.visibility</p:attrName>
+                                        </p:attrNameLst>
+                                      </p:cBhvr>
+                                      <p:to>
+                                        <p:strVal val="visible"/>
+                                      </p:to>
+                                    </p:set>
+                                    <p:animEffect transition="in" filter="fade">
+                                      <p:cBhvr>
+                                        <p:cTn id="10" dur="500"/>
+                                        <p:tgtEl>
+                                          <p:spTgt spid="3"/>
+                                        </p:tgtEl>
+                                      </p:cBhvr>
+                                    </p:animEffect>
+                                  </p:childTnLst>
+                                </p:cTn>
+                              </p:par>
+                              <p:par>
+                                <p:cTn id="11" presetID="10" presetClass="entr" presetSubtype="0" fill="hold" nodeType="withEffect">
+                                  <p:stCondLst>
+                                    <p:cond delay="0"/>
+                                  </p:stCondLst>
+                                  <p:childTnLst>
+                                    <p:set>
+                                      <p:cBhvr>
+                                        <p:cTn id="12" dur="1" fill="hold">
+                                          <p:stCondLst>
+                                            <p:cond delay="0"/>
+                                          </p:stCondLst>
+                                        </p:cTn>
+                                        <p:tgtEl>
+                                          <p:spTgt spid="7"/>
+                                        </p:tgtEl>
+                                        <p:attrNameLst>
+                                          <p:attrName>style.visibility</p:attrName>
+                                        </p:attrNameLst>
+                                      </p:cBhvr>
+                                      <p:to>
+                                        <p:strVal val="visible"/>
+                                      </p:to>
+                                    </p:set>
+                                    <p:animEffect transition="in" filter="fade">
+                                      <p:cBhvr>
+                                        <p:cTn id="13" dur="500"/>
+                                        <p:tgtEl>
+                                          <p:spTgt spid="7"/>
+                                        </p:tgtEl>
+                                      </p:cBhvr>
+                                    </p:animEffect>
+                                  </p:childTnLst>
+                                </p:cTn>
+                              </p:par>
+                            </p:childTnLst>
+                          </p:cTn>
+                        </p:par>
+                      </p:childTnLst>
+                    </p:cTn>
+                  </p:par>
+                  <p:par>
+                    <p:cTn id="14" fill="hold">
+                      <p:stCondLst>
+                        <p:cond delay="indefinite"/>
+                      </p:stCondLst>
+                      <p:childTnLst>
+                        <p:par>
+                          <p:cTn id="15" fill="hold">
+                            <p:stCondLst>
+                              <p:cond delay="0"/>
+                            </p:stCondLst>
+                            <p:childTnLst>
+                              <p:par>
+                                <p:cTn id="16" presetID="10" presetClass="entr" presetSubtype="0" fill="hold" grpId="0" nodeType="clickEffect">
+                                  <p:stCondLst>
+                                    <p:cond delay="0"/>
+                                  </p:stCondLst>
+                                  <p:childTnLst>
+                                    <p:set>
+                                      <p:cBhvr>
+                                        <p:cTn id="17" dur="1" fill="hold">
+                                          <p:stCondLst>
+                                            <p:cond delay="0"/>
+                                          </p:stCondLst>
+                                        </p:cTn>
+                                        <p:tgtEl>
+                                          <p:spTgt spid="8"/>
+                                        </p:tgtEl>
+                                        <p:attrNameLst>
+                                          <p:attrName>style.visibility</p:attrName>
+                                        </p:attrNameLst>
+                                      </p:cBhvr>
+                                      <p:to>
+                                        <p:strVal val="visible"/>
+                                      </p:to>
+                                    </p:set>
+                                    <p:animEffect transition="in" filter="fade">
+                                      <p:cBhvr>
+                                        <p:cTn id="18" dur="500"/>
+                                        <p:tgtEl>
+                                          <p:spTgt spid="8"/>
+                                        </p:tgtEl>
+                                      </p:cBhvr>
+                                    </p:animEffect>
+                                  </p:childTnLst>
+                                </p:cTn>
+                              </p:par>
+                              <p:par>
+                                <p:cTn id="19" presetID="10" presetClass="entr" presetSubtype="0" fill="hold" nodeType="withEffect">
+                                  <p:stCondLst>
+                                    <p:cond delay="0"/>
+                                  </p:stCondLst>
+                                  <p:childTnLst>
+                                    <p:set>
+                                      <p:cBhvr>
+                                        <p:cTn id="20" dur="1" fill="hold">
+                                          <p:stCondLst>
+                                            <p:cond delay="0"/>
+                                          </p:stCondLst>
+                                        </p:cTn>
+                                        <p:tgtEl>
+                                          <p:spTgt spid="9"/>
+                                        </p:tgtEl>
+                                        <p:attrNameLst>
+                                          <p:attrName>style.visibility</p:attrName>
+                                        </p:attrNameLst>
+                                      </p:cBhvr>
+                                      <p:to>
+                                        <p:strVal val="visible"/>
+                                      </p:to>
+                                    </p:set>
+                                    <p:animEffect transition="in" filter="fade">
+                                      <p:cBhvr>
+                                        <p:cTn id="21" dur="500"/>
+                                        <p:tgtEl>
+                                          <p:spTgt spid="9"/>
+                                        </p:tgtEl>
+                                      </p:cBhvr>
+                                    </p:animEffect>
+                                  </p:childTnLst>
+                                </p:cTn>
+                              </p:par>
+                              <p:par>
+                                <p:cTn id="22" presetID="10" presetClass="entr" presetSubtype="0" fill="hold" nodeType="withEffect">
+                                  <p:stCondLst>
+                                    <p:cond delay="0"/>
+                                  </p:stCondLst>
+                                  <p:childTnLst>
+                                    <p:set>
+                                      <p:cBhvr>
+                                        <p:cTn id="23" dur="1" fill="hold">
+                                          <p:stCondLst>
+                                            <p:cond delay="0"/>
+                                          </p:stCondLst>
+                                        </p:cTn>
+                                        <p:tgtEl>
+                                          <p:spTgt spid="10"/>
+                                        </p:tgtEl>
+                                        <p:attrNameLst>
+                                          <p:attrName>style.visibility</p:attrName>
+                                        </p:attrNameLst>
+                                      </p:cBhvr>
+                                      <p:to>
+                                        <p:strVal val="visible"/>
+                                      </p:to>
+                                    </p:set>
+                                    <p:animEffect transition="in" filter="fade">
+                                      <p:cBhvr>
+                                        <p:cTn id="24" dur="500"/>
+                                        <p:tgtEl>
+                                          <p:spTgt spid="10"/>
+                                        </p:tgtEl>
+                                      </p:cBhvr>
+                                    </p:animEffect>
+                                  </p:childTnLst>
+                                </p:cTn>
+                              </p:par>
+                            </p:childTnLst>
+                          </p:cTn>
+                        </p:par>
+                      </p:childTnLst>
+                    </p:cTn>
+                  </p:par>
+                </p:childTnLst>
+              </p:cTn>
+              <p:prevCondLst>
+                <p:cond evt="onPrev" delay="0">
+                  <p:tgtEl>
+                    <p:sldTgt/>
+                  </p:tgtEl>
+                </p:cond>
+              </p:prevCondLst>
+              <p:nextCondLst>
+                <p:cond evt="onNext" delay="0">
+                  <p:tgtEl>
+                    <p:sldTgt/>
+                  </p:tgtEl>
+                </p:cond>
+              </p:nextCondLst>
+            </p:seq>
+          </p:childTnLst>
+        </p:cTn>
+      </p:par>
+    </p:tnLst>
+    <p:bldLst>
+      <p:bldP spid="5" grpId="0"/>
+      <p:bldP spid="8" grpId="0"/>
+    </p:bldLst>
+  </p:timing>
 </p:sld>
 </file>
 
@@ -9866,6 +10616,9 @@
   <p:clrMapOvr>
     <a:masterClrMapping/>
   </p:clrMapOvr>
+  <p:transition spd="slow">
+    <p:push dir="u"/>
+  </p:transition>
 </p:sld>
 </file>
 
@@ -10002,6 +10755,9 @@
   <p:clrMapOvr>
     <a:masterClrMapping/>
   </p:clrMapOvr>
+  <p:transition spd="slow">
+    <p:push dir="u"/>
+  </p:transition>
 </p:sld>
 </file>
 
@@ -10038,7 +10794,12 @@
             <p:ph type="title"/>
           </p:nvPr>
         </p:nvSpPr>
-        <p:spPr/>
+        <p:spPr>
+          <a:xfrm>
+            <a:off x="913795" y="584752"/>
+            <a:ext cx="10353762" cy="970450"/>
+          </a:xfrm>
+        </p:spPr>
         <p:txBody>
           <a:bodyPr/>
           <a:lstStyle/>
@@ -10762,6 +11523,66 @@
           </a:prstGeom>
         </p:spPr>
       </p:pic>
+      <p:pic>
+        <p:nvPicPr>
+          <p:cNvPr id="3" name="Picture 4" descr="Text&#10;&#10;Description automatically generated">
+            <a:extLst>
+              <a:ext uri="{FF2B5EF4-FFF2-40B4-BE49-F238E27FC236}">
+                <a16:creationId xmlns:a16="http://schemas.microsoft.com/office/drawing/2014/main" id="{5BFD1238-858D-5F4B-97D6-6051B87E938E}"/>
+              </a:ext>
+            </a:extLst>
+          </p:cNvPr>
+          <p:cNvPicPr>
+            <a:picLocks noChangeAspect="1"/>
+          </p:cNvPicPr>
+          <p:nvPr/>
+        </p:nvPicPr>
+        <p:blipFill>
+          <a:blip r:embed="rId2"/>
+          <a:stretch>
+            <a:fillRect/>
+          </a:stretch>
+        </p:blipFill>
+        <p:spPr>
+          <a:xfrm>
+            <a:off x="5877289" y="3533708"/>
+            <a:ext cx="5863337" cy="2337642"/>
+          </a:xfrm>
+          <a:prstGeom prst="rect">
+            <a:avLst/>
+          </a:prstGeom>
+        </p:spPr>
+      </p:pic>
+      <p:pic>
+        <p:nvPicPr>
+          <p:cNvPr id="5" name="Picture 6">
+            <a:extLst>
+              <a:ext uri="{FF2B5EF4-FFF2-40B4-BE49-F238E27FC236}">
+                <a16:creationId xmlns:a16="http://schemas.microsoft.com/office/drawing/2014/main" id="{8D4E9046-6F83-1DCB-07AE-03DDB5A56130}"/>
+              </a:ext>
+            </a:extLst>
+          </p:cNvPr>
+          <p:cNvPicPr>
+            <a:picLocks noChangeAspect="1"/>
+          </p:cNvPicPr>
+          <p:nvPr/>
+        </p:nvPicPr>
+        <p:blipFill>
+          <a:blip r:embed="rId3"/>
+          <a:stretch>
+            <a:fillRect/>
+          </a:stretch>
+        </p:blipFill>
+        <p:spPr>
+          <a:xfrm>
+            <a:off x="3290775" y="5541407"/>
+            <a:ext cx="1484454" cy="706993"/>
+          </a:xfrm>
+          <a:prstGeom prst="rect">
+            <a:avLst/>
+          </a:prstGeom>
+        </p:spPr>
+      </p:pic>
     </p:spTree>
     <p:extLst>
       <p:ext uri="{BB962C8B-B14F-4D97-AF65-F5344CB8AC3E}">
@@ -10772,6 +11593,9 @@
   <p:clrMapOvr>
     <a:masterClrMapping/>
   </p:clrMapOvr>
+  <p:transition spd="slow">
+    <p:push dir="u"/>
+  </p:transition>
 </p:sld>
 </file>
 
@@ -11077,7 +11901,7 @@
         </p:blipFill>
         <p:spPr>
           <a:xfrm>
-            <a:off x="1059083" y="3716253"/>
+            <a:off x="1059083" y="3707144"/>
             <a:ext cx="4537275" cy="2367391"/>
           </a:xfrm>
           <a:prstGeom prst="rect">
@@ -11253,6 +12077,289 @@
   <p:clrMapOvr>
     <a:masterClrMapping/>
   </p:clrMapOvr>
+  <p:transition spd="slow">
+    <p:push dir="u"/>
+  </p:transition>
+  <p:timing>
+    <p:tnLst>
+      <p:par>
+        <p:cTn id="1" dur="indefinite" restart="never" nodeType="tmRoot">
+          <p:childTnLst>
+            <p:seq concurrent="1" nextAc="seek">
+              <p:cTn id="2" dur="indefinite" nodeType="mainSeq">
+                <p:childTnLst>
+                  <p:par>
+                    <p:cTn id="3" fill="hold">
+                      <p:stCondLst>
+                        <p:cond delay="indefinite"/>
+                      </p:stCondLst>
+                      <p:childTnLst>
+                        <p:par>
+                          <p:cTn id="4" fill="hold">
+                            <p:stCondLst>
+                              <p:cond delay="0"/>
+                            </p:stCondLst>
+                            <p:childTnLst>
+                              <p:par>
+                                <p:cTn id="5" presetID="10" presetClass="entr" presetSubtype="0" fill="hold" grpId="0" nodeType="clickEffect">
+                                  <p:stCondLst>
+                                    <p:cond delay="0"/>
+                                  </p:stCondLst>
+                                  <p:childTnLst>
+                                    <p:set>
+                                      <p:cBhvr>
+                                        <p:cTn id="6" dur="1" fill="hold">
+                                          <p:stCondLst>
+                                            <p:cond delay="0"/>
+                                          </p:stCondLst>
+                                        </p:cTn>
+                                        <p:tgtEl>
+                                          <p:spTgt spid="11"/>
+                                        </p:tgtEl>
+                                        <p:attrNameLst>
+                                          <p:attrName>style.visibility</p:attrName>
+                                        </p:attrNameLst>
+                                      </p:cBhvr>
+                                      <p:to>
+                                        <p:strVal val="visible"/>
+                                      </p:to>
+                                    </p:set>
+                                    <p:animEffect transition="in" filter="fade">
+                                      <p:cBhvr>
+                                        <p:cTn id="7" dur="500"/>
+                                        <p:tgtEl>
+                                          <p:spTgt spid="11"/>
+                                        </p:tgtEl>
+                                      </p:cBhvr>
+                                    </p:animEffect>
+                                  </p:childTnLst>
+                                </p:cTn>
+                              </p:par>
+                              <p:par>
+                                <p:cTn id="8" presetID="10" presetClass="entr" presetSubtype="0" fill="hold" nodeType="withEffect">
+                                  <p:stCondLst>
+                                    <p:cond delay="0"/>
+                                  </p:stCondLst>
+                                  <p:childTnLst>
+                                    <p:set>
+                                      <p:cBhvr>
+                                        <p:cTn id="9" dur="1" fill="hold">
+                                          <p:stCondLst>
+                                            <p:cond delay="0"/>
+                                          </p:stCondLst>
+                                        </p:cTn>
+                                        <p:tgtEl>
+                                          <p:spTgt spid="7"/>
+                                        </p:tgtEl>
+                                        <p:attrNameLst>
+                                          <p:attrName>style.visibility</p:attrName>
+                                        </p:attrNameLst>
+                                      </p:cBhvr>
+                                      <p:to>
+                                        <p:strVal val="visible"/>
+                                      </p:to>
+                                    </p:set>
+                                    <p:animEffect transition="in" filter="fade">
+                                      <p:cBhvr>
+                                        <p:cTn id="10" dur="500"/>
+                                        <p:tgtEl>
+                                          <p:spTgt spid="7"/>
+                                        </p:tgtEl>
+                                      </p:cBhvr>
+                                    </p:animEffect>
+                                  </p:childTnLst>
+                                </p:cTn>
+                              </p:par>
+                              <p:par>
+                                <p:cTn id="11" presetID="10" presetClass="entr" presetSubtype="0" fill="hold" nodeType="withEffect">
+                                  <p:stCondLst>
+                                    <p:cond delay="0"/>
+                                  </p:stCondLst>
+                                  <p:childTnLst>
+                                    <p:set>
+                                      <p:cBhvr>
+                                        <p:cTn id="12" dur="1" fill="hold">
+                                          <p:stCondLst>
+                                            <p:cond delay="0"/>
+                                          </p:stCondLst>
+                                        </p:cTn>
+                                        <p:tgtEl>
+                                          <p:spTgt spid="5"/>
+                                        </p:tgtEl>
+                                        <p:attrNameLst>
+                                          <p:attrName>style.visibility</p:attrName>
+                                        </p:attrNameLst>
+                                      </p:cBhvr>
+                                      <p:to>
+                                        <p:strVal val="visible"/>
+                                      </p:to>
+                                    </p:set>
+                                    <p:animEffect transition="in" filter="fade">
+                                      <p:cBhvr>
+                                        <p:cTn id="13" dur="500"/>
+                                        <p:tgtEl>
+                                          <p:spTgt spid="5"/>
+                                        </p:tgtEl>
+                                      </p:cBhvr>
+                                    </p:animEffect>
+                                  </p:childTnLst>
+                                </p:cTn>
+                              </p:par>
+                            </p:childTnLst>
+                          </p:cTn>
+                        </p:par>
+                      </p:childTnLst>
+                    </p:cTn>
+                  </p:par>
+                  <p:par>
+                    <p:cTn id="14" fill="hold">
+                      <p:stCondLst>
+                        <p:cond delay="indefinite"/>
+                      </p:stCondLst>
+                      <p:childTnLst>
+                        <p:par>
+                          <p:cTn id="15" fill="hold">
+                            <p:stCondLst>
+                              <p:cond delay="0"/>
+                            </p:stCondLst>
+                            <p:childTnLst>
+                              <p:par>
+                                <p:cTn id="16" presetID="10" presetClass="entr" presetSubtype="0" fill="hold" grpId="0" nodeType="clickEffect">
+                                  <p:stCondLst>
+                                    <p:cond delay="0"/>
+                                  </p:stCondLst>
+                                  <p:childTnLst>
+                                    <p:set>
+                                      <p:cBhvr>
+                                        <p:cTn id="17" dur="1" fill="hold">
+                                          <p:stCondLst>
+                                            <p:cond delay="0"/>
+                                          </p:stCondLst>
+                                        </p:cTn>
+                                        <p:tgtEl>
+                                          <p:spTgt spid="12"/>
+                                        </p:tgtEl>
+                                        <p:attrNameLst>
+                                          <p:attrName>style.visibility</p:attrName>
+                                        </p:attrNameLst>
+                                      </p:cBhvr>
+                                      <p:to>
+                                        <p:strVal val="visible"/>
+                                      </p:to>
+                                    </p:set>
+                                    <p:animEffect transition="in" filter="fade">
+                                      <p:cBhvr>
+                                        <p:cTn id="18" dur="500"/>
+                                        <p:tgtEl>
+                                          <p:spTgt spid="12"/>
+                                        </p:tgtEl>
+                                      </p:cBhvr>
+                                    </p:animEffect>
+                                  </p:childTnLst>
+                                </p:cTn>
+                              </p:par>
+                              <p:par>
+                                <p:cTn id="19" presetID="10" presetClass="entr" presetSubtype="0" fill="hold" nodeType="withEffect">
+                                  <p:stCondLst>
+                                    <p:cond delay="0"/>
+                                  </p:stCondLst>
+                                  <p:childTnLst>
+                                    <p:set>
+                                      <p:cBhvr>
+                                        <p:cTn id="20" dur="1" fill="hold">
+                                          <p:stCondLst>
+                                            <p:cond delay="0"/>
+                                          </p:stCondLst>
+                                        </p:cTn>
+                                        <p:tgtEl>
+                                          <p:spTgt spid="13"/>
+                                        </p:tgtEl>
+                                        <p:attrNameLst>
+                                          <p:attrName>style.visibility</p:attrName>
+                                        </p:attrNameLst>
+                                      </p:cBhvr>
+                                      <p:to>
+                                        <p:strVal val="visible"/>
+                                      </p:to>
+                                    </p:set>
+                                    <p:animEffect transition="in" filter="fade">
+                                      <p:cBhvr>
+                                        <p:cTn id="21" dur="500"/>
+                                        <p:tgtEl>
+                                          <p:spTgt spid="13"/>
+                                        </p:tgtEl>
+                                      </p:cBhvr>
+                                    </p:animEffect>
+                                  </p:childTnLst>
+                                </p:cTn>
+                              </p:par>
+                              <p:par>
+                                <p:cTn id="22" presetID="10" presetClass="entr" presetSubtype="0" fill="hold" nodeType="withEffect">
+                                  <p:stCondLst>
+                                    <p:cond delay="0"/>
+                                  </p:stCondLst>
+                                  <p:childTnLst>
+                                    <p:set>
+                                      <p:cBhvr>
+                                        <p:cTn id="23" dur="1" fill="hold">
+                                          <p:stCondLst>
+                                            <p:cond delay="0"/>
+                                          </p:stCondLst>
+                                        </p:cTn>
+                                        <p:tgtEl>
+                                          <p:spTgt spid="14"/>
+                                        </p:tgtEl>
+                                        <p:attrNameLst>
+                                          <p:attrName>style.visibility</p:attrName>
+                                        </p:attrNameLst>
+                                      </p:cBhvr>
+                                      <p:to>
+                                        <p:strVal val="visible"/>
+                                      </p:to>
+                                    </p:set>
+                                    <p:animEffect transition="in" filter="fade">
+                                      <p:cBhvr>
+                                        <p:cTn id="24" dur="500"/>
+                                        <p:tgtEl>
+                                          <p:spTgt spid="14"/>
+                                        </p:tgtEl>
+                                      </p:cBhvr>
+                                    </p:animEffect>
+                                  </p:childTnLst>
+                                </p:cTn>
+                              </p:par>
+                            </p:childTnLst>
+                          </p:cTn>
+                        </p:par>
+                      </p:childTnLst>
+                    </p:cTn>
+                  </p:par>
+                </p:childTnLst>
+              </p:cTn>
+              <p:prevCondLst>
+                <p:cond evt="onPrev" delay="0">
+                  <p:tgtEl>
+                    <p:sldTgt/>
+                  </p:tgtEl>
+                </p:cond>
+              </p:prevCondLst>
+              <p:nextCondLst>
+                <p:cond evt="onNext" delay="0">
+                  <p:tgtEl>
+                    <p:sldTgt/>
+                  </p:tgtEl>
+                </p:cond>
+              </p:nextCondLst>
+            </p:seq>
+          </p:childTnLst>
+        </p:cTn>
+      </p:par>
+    </p:tnLst>
+    <p:bldLst>
+      <p:bldP spid="11" grpId="0"/>
+      <p:bldP spid="12" grpId="0"/>
+    </p:bldLst>
+  </p:timing>
 </p:sld>
 </file>
 

</xml_diff>

<commit_message>
Diagramma useCase mainīta, lai to labak redzētu
</commit_message>
<xml_diff>
--- a/Simbolu virknes.pptx
+++ b/Simbolu virknes.pptx
@@ -17,8 +17,6 @@
     <p:sldId id="264" r:id="rId11"/>
     <p:sldId id="267" r:id="rId12"/>
     <p:sldId id="259" r:id="rId13"/>
-    <p:sldId id="268" r:id="rId14"/>
-    <p:sldId id="269" r:id="rId15"/>
   </p:sldIdLst>
   <p:sldSz cx="12192000" cy="6858000"/>
   <p:notesSz cx="6858000" cy="9144000"/>
@@ -7380,138 +7378,6 @@
   <p:transition spd="slow">
     <p:push dir="u"/>
   </p:transition>
-</p:sld>
-</file>
-
-<file path=ppt/slides/slide13.xml><?xml version="1.0" encoding="utf-8"?>
-<p:sld xmlns:a="http://schemas.openxmlformats.org/drawingml/2006/main" xmlns:r="http://schemas.openxmlformats.org/officeDocument/2006/relationships" xmlns:p="http://schemas.openxmlformats.org/presentationml/2006/main">
-  <p:cSld>
-    <p:spTree>
-      <p:nvGrpSpPr>
-        <p:cNvPr id="1" name=""/>
-        <p:cNvGrpSpPr/>
-        <p:nvPr/>
-      </p:nvGrpSpPr>
-      <p:grpSpPr>
-        <a:xfrm>
-          <a:off x="0" y="0"/>
-          <a:ext cx="0" cy="0"/>
-          <a:chOff x="0" y="0"/>
-          <a:chExt cx="0" cy="0"/>
-        </a:xfrm>
-      </p:grpSpPr>
-      <p:pic>
-        <p:nvPicPr>
-          <p:cNvPr id="9" name="Рисунок 8">
-            <a:extLst>
-              <a:ext uri="{FF2B5EF4-FFF2-40B4-BE49-F238E27FC236}">
-                <a16:creationId xmlns:a16="http://schemas.microsoft.com/office/drawing/2014/main" id="{0C3704E5-E86F-5A52-8FCA-FE9DD55ABBC3}"/>
-              </a:ext>
-            </a:extLst>
-          </p:cNvPr>
-          <p:cNvPicPr>
-            <a:picLocks noChangeAspect="1"/>
-          </p:cNvPicPr>
-          <p:nvPr/>
-        </p:nvPicPr>
-        <p:blipFill>
-          <a:blip r:embed="rId2">
-            <a:extLst>
-              <a:ext uri="{28A0092B-C50C-407E-A947-70E740481C1C}">
-                <a14:useLocalDpi xmlns:a14="http://schemas.microsoft.com/office/drawing/2010/main" val="0"/>
-              </a:ext>
-            </a:extLst>
-          </a:blip>
-          <a:stretch>
-            <a:fillRect/>
-          </a:stretch>
-        </p:blipFill>
-        <p:spPr>
-          <a:xfrm>
-            <a:off x="74428" y="2701298"/>
-            <a:ext cx="12043144" cy="1455403"/>
-          </a:xfrm>
-          <a:prstGeom prst="rect">
-            <a:avLst/>
-          </a:prstGeom>
-        </p:spPr>
-      </p:pic>
-    </p:spTree>
-    <p:extLst>
-      <p:ext uri="{BB962C8B-B14F-4D97-AF65-F5344CB8AC3E}">
-        <p14:creationId xmlns:p14="http://schemas.microsoft.com/office/powerpoint/2010/main" val="64544731"/>
-      </p:ext>
-    </p:extLst>
-  </p:cSld>
-  <p:clrMapOvr>
-    <a:masterClrMapping/>
-  </p:clrMapOvr>
-</p:sld>
-</file>
-
-<file path=ppt/slides/slide14.xml><?xml version="1.0" encoding="utf-8"?>
-<p:sld xmlns:a="http://schemas.openxmlformats.org/drawingml/2006/main" xmlns:r="http://schemas.openxmlformats.org/officeDocument/2006/relationships" xmlns:p="http://schemas.openxmlformats.org/presentationml/2006/main">
-  <p:cSld>
-    <p:spTree>
-      <p:nvGrpSpPr>
-        <p:cNvPr id="1" name=""/>
-        <p:cNvGrpSpPr/>
-        <p:nvPr/>
-      </p:nvGrpSpPr>
-      <p:grpSpPr>
-        <a:xfrm>
-          <a:off x="0" y="0"/>
-          <a:ext cx="0" cy="0"/>
-          <a:chOff x="0" y="0"/>
-          <a:chExt cx="0" cy="0"/>
-        </a:xfrm>
-      </p:grpSpPr>
-      <p:pic>
-        <p:nvPicPr>
-          <p:cNvPr id="4" name="Рисунок 3">
-            <a:extLst>
-              <a:ext uri="{FF2B5EF4-FFF2-40B4-BE49-F238E27FC236}">
-                <a16:creationId xmlns:a16="http://schemas.microsoft.com/office/drawing/2014/main" id="{4DBA0820-324D-1008-B87A-5AB05B19E20C}"/>
-              </a:ext>
-            </a:extLst>
-          </p:cNvPr>
-          <p:cNvPicPr>
-            <a:picLocks noChangeAspect="1"/>
-          </p:cNvPicPr>
-          <p:nvPr/>
-        </p:nvPicPr>
-        <p:blipFill>
-          <a:blip r:embed="rId2">
-            <a:extLst>
-              <a:ext uri="{28A0092B-C50C-407E-A947-70E740481C1C}">
-                <a14:useLocalDpi xmlns:a14="http://schemas.microsoft.com/office/drawing/2010/main" val="0"/>
-              </a:ext>
-            </a:extLst>
-          </a:blip>
-          <a:stretch>
-            <a:fillRect/>
-          </a:stretch>
-        </p:blipFill>
-        <p:spPr>
-          <a:xfrm>
-            <a:off x="3753165" y="300370"/>
-            <a:ext cx="4685669" cy="6257260"/>
-          </a:xfrm>
-          <a:prstGeom prst="rect">
-            <a:avLst/>
-          </a:prstGeom>
-        </p:spPr>
-      </p:pic>
-    </p:spTree>
-    <p:extLst>
-      <p:ext uri="{BB962C8B-B14F-4D97-AF65-F5344CB8AC3E}">
-        <p14:creationId xmlns:p14="http://schemas.microsoft.com/office/powerpoint/2010/main" val="2655404090"/>
-      </p:ext>
-    </p:extLst>
-  </p:cSld>
-  <p:clrMapOvr>
-    <a:masterClrMapping/>
-  </p:clrMapOvr>
 </p:sld>
 </file>
 

</xml_diff>